<commit_message>
Start witth create recipe
</commit_message>
<xml_diff>
--- a/receptenboek.pptx
+++ b/receptenboek.pptx
@@ -679,7 +679,7 @@
         <p:txBody>
           <a:bodyPr/>
           <a:p>
-            <a:fld id="{0034A4BB-D801-48D4-8CF9-D001A75C9645}" type="slidenum">
+            <a:fld id="{9D68B13F-7A18-49F4-A537-8F736308E916}" type="slidenum">
               <a:t>&lt;#&gt;</a:t>
             </a:fld>
           </a:p>
@@ -836,7 +836,7 @@
         <p:txBody>
           <a:bodyPr/>
           <a:p>
-            <a:fld id="{910ECA47-A1E9-423C-B042-D679A8F9FB21}" type="slidenum">
+            <a:fld id="{5E7BA6CF-8ED5-492B-8C33-8622667BCC3A}" type="slidenum">
               <a:t>&lt;#&gt;</a:t>
             </a:fld>
           </a:p>
@@ -990,7 +990,7 @@
         <p:txBody>
           <a:bodyPr/>
           <a:p>
-            <a:fld id="{9EFA936C-14E3-40DE-9870-0B9F79A2A82B}" type="slidenum">
+            <a:fld id="{37A4105B-23BC-4CBE-82D1-E9680E1E9D24}" type="slidenum">
               <a:t>&lt;#&gt;</a:t>
             </a:fld>
           </a:p>
@@ -1178,7 +1178,7 @@
         <p:txBody>
           <a:bodyPr/>
           <a:p>
-            <a:fld id="{AC73CD0B-D120-4A5B-B230-2FDDEF7B2412}" type="slidenum">
+            <a:fld id="{722ACC46-7E1B-456E-9BDC-5DBCDAEC08DF}" type="slidenum">
               <a:t>&lt;#&gt;</a:t>
             </a:fld>
           </a:p>
@@ -1298,7 +1298,7 @@
         <p:txBody>
           <a:bodyPr/>
           <a:p>
-            <a:fld id="{B24B6610-5412-4395-82A8-2B3A5B212610}" type="slidenum">
+            <a:fld id="{79EF4F4D-D79F-495D-9E9E-ACF671CCB09C}" type="slidenum">
               <a:t>&lt;#&gt;</a:t>
             </a:fld>
           </a:p>
@@ -1418,7 +1418,7 @@
         <p:txBody>
           <a:bodyPr/>
           <a:p>
-            <a:fld id="{BC657219-EF7A-49D5-B249-3275C6B1D820}" type="slidenum">
+            <a:fld id="{A130A2DA-B026-483E-A75C-8104440A88F0}" type="slidenum">
               <a:t>&lt;#&gt;</a:t>
             </a:fld>
           </a:p>
@@ -1640,7 +1640,7 @@
         <p:txBody>
           <a:bodyPr/>
           <a:p>
-            <a:fld id="{52DC9F47-284F-4D88-B8FE-B3F1621C2AFC}" type="slidenum">
+            <a:fld id="{CC4B6C9C-5DE7-4C94-B7C9-3CFFBC1097F3}" type="slidenum">
               <a:t>&lt;#&gt;</a:t>
             </a:fld>
           </a:p>
@@ -1958,7 +1958,7 @@
         <p:txBody>
           <a:bodyPr/>
           <a:p>
-            <a:fld id="{9E2E1F41-B26A-4D67-AABC-7B1BDCD30BDB}" type="slidenum">
+            <a:fld id="{CD3336A4-B411-4FCD-9099-E79512E87FD9}" type="slidenum">
               <a:t>&lt;#&gt;</a:t>
             </a:fld>
           </a:p>
@@ -2180,7 +2180,7 @@
         <p:txBody>
           <a:bodyPr/>
           <a:p>
-            <a:fld id="{CB20F69C-7CCA-4ED3-B9EE-62714F580E49}" type="slidenum">
+            <a:fld id="{50456B3A-26CC-407C-A21C-4980AF9BB05B}" type="slidenum">
               <a:t>&lt;#&gt;</a:t>
             </a:fld>
           </a:p>
@@ -2368,7 +2368,7 @@
         <p:txBody>
           <a:bodyPr/>
           <a:p>
-            <a:fld id="{38AFD670-B085-4274-AACD-4CDFCC4E7CE9}" type="slidenum">
+            <a:fld id="{E2DC0CA5-B570-4644-B41C-224824E7750F}" type="slidenum">
               <a:t>&lt;#&gt;</a:t>
             </a:fld>
           </a:p>
@@ -2624,7 +2624,7 @@
         <p:txBody>
           <a:bodyPr/>
           <a:p>
-            <a:fld id="{CAD7A10A-91AC-4BC9-8E8B-32F0D46917AE}" type="slidenum">
+            <a:fld id="{68DAB455-9CCC-49FB-970E-EFFF4E323CE3}" type="slidenum">
               <a:t>&lt;#&gt;</a:t>
             </a:fld>
           </a:p>
@@ -2948,7 +2948,7 @@
         <p:txBody>
           <a:bodyPr/>
           <a:p>
-            <a:fld id="{DB2241D8-C91C-41C2-B8B1-F8E5EC676B1E}" type="slidenum">
+            <a:fld id="{DB70B080-924D-4DCB-9D29-F631F75C5BAA}" type="slidenum">
               <a:t>&lt;#&gt;</a:t>
             </a:fld>
           </a:p>
@@ -3834,7 +3834,7 @@
         <p:spPr>
           <a:xfrm>
             <a:off x="4104000" y="4896000"/>
-            <a:ext cx="4390560" cy="344880"/>
+            <a:ext cx="4390200" cy="344520"/>
           </a:xfrm>
           <a:prstGeom prst="rect">
             <a:avLst/>
@@ -3861,7 +3861,7 @@
               </a:lnSpc>
               <a:buNone/>
             </a:pPr>
-            <a:fld id="{C82E7F7D-63F2-4935-8685-88EE4502A673}" type="author">
+            <a:fld id="{E640B6E5-BDD9-43D6-AF07-F3BFD8968365}" type="author">
               <a:rPr b="0" lang="en-US" sz="1800" spc="-1" strike="noStrike">
                 <a:solidFill>
                   <a:srgbClr val="000000"/>
@@ -3886,7 +3886,7 @@
         <p:spPr>
           <a:xfrm>
             <a:off x="25920" y="4628880"/>
-            <a:ext cx="6118560" cy="16560"/>
+            <a:ext cx="6118200" cy="16200"/>
           </a:xfrm>
           <a:custGeom>
             <a:avLst/>
@@ -3946,7 +3946,7 @@
         <p:spPr>
           <a:xfrm>
             <a:off x="3859200" y="5324400"/>
-            <a:ext cx="6238800" cy="5760"/>
+            <a:ext cx="6238440" cy="5400"/>
           </a:xfrm>
           <a:custGeom>
             <a:avLst/>
@@ -4006,7 +4006,7 @@
         <p:spPr>
           <a:xfrm>
             <a:off x="4044960" y="4944960"/>
-            <a:ext cx="5760" cy="486000"/>
+            <a:ext cx="5400" cy="485640"/>
           </a:xfrm>
           <a:custGeom>
             <a:avLst/>
@@ -4328,7 +4328,7 @@
         <p:spPr>
           <a:xfrm>
             <a:off x="20880" y="607320"/>
-            <a:ext cx="6118560" cy="16560"/>
+            <a:ext cx="6118200" cy="16200"/>
           </a:xfrm>
           <a:custGeom>
             <a:avLst/>
@@ -4388,7 +4388,7 @@
         <p:spPr>
           <a:xfrm>
             <a:off x="4430520" y="840960"/>
-            <a:ext cx="5672520" cy="5760"/>
+            <a:ext cx="5672160" cy="5400"/>
           </a:xfrm>
           <a:custGeom>
             <a:avLst/>
@@ -4448,7 +4448,7 @@
         <p:spPr>
           <a:xfrm>
             <a:off x="9819720" y="474480"/>
-            <a:ext cx="5760" cy="491760"/>
+            <a:ext cx="5400" cy="491400"/>
           </a:xfrm>
           <a:custGeom>
             <a:avLst/>
@@ -4500,7 +4500,7 @@
         <p:spPr>
           <a:xfrm>
             <a:off x="1900800" y="5204880"/>
-            <a:ext cx="7463880" cy="5760"/>
+            <a:ext cx="7463520" cy="5400"/>
           </a:xfrm>
           <a:custGeom>
             <a:avLst/>
@@ -4560,7 +4560,7 @@
         <p:spPr>
           <a:xfrm>
             <a:off x="9259920" y="4917240"/>
-            <a:ext cx="5760" cy="348120"/>
+            <a:ext cx="5400" cy="347760"/>
           </a:xfrm>
           <a:custGeom>
             <a:avLst/>
@@ -4616,7 +4616,7 @@
         <p:spPr>
           <a:xfrm>
             <a:off x="2520000" y="5256000"/>
-            <a:ext cx="4678560" cy="408960"/>
+            <a:ext cx="4678200" cy="408600"/>
           </a:xfrm>
           <a:prstGeom prst="rect">
             <a:avLst/>
@@ -4673,7 +4673,7 @@
         <p:spPr>
           <a:xfrm>
             <a:off x="7560000" y="5256000"/>
-            <a:ext cx="1618560" cy="408960"/>
+            <a:ext cx="1618200" cy="408600"/>
           </a:xfrm>
           <a:prstGeom prst="rect">
             <a:avLst/>
@@ -4705,7 +4705,7 @@
               </a:lnSpc>
               <a:buNone/>
             </a:pPr>
-            <a:fld id="{B6644789-7281-4973-A5B7-6C9E6B2B40B4}" type="slidenum">
+            <a:fld id="{14F01D1C-E544-4C75-90FC-4575B55EA5D1}" type="slidenum">
               <a:rPr b="0" lang="en-US" sz="1400" spc="-1" strike="noStrike">
                 <a:latin typeface="Arial"/>
               </a:rPr>
@@ -4730,7 +4730,7 @@
         <p:spPr>
           <a:xfrm>
             <a:off x="504000" y="5256000"/>
-            <a:ext cx="1654560" cy="408960"/>
+            <a:ext cx="1654200" cy="408600"/>
           </a:xfrm>
           <a:prstGeom prst="rect">
             <a:avLst/>
@@ -5040,7 +5040,7 @@
         <p:spPr>
           <a:xfrm>
             <a:off x="457200" y="1600200"/>
-            <a:ext cx="8998560" cy="657000"/>
+            <a:ext cx="8998200" cy="656640"/>
           </a:xfrm>
           <a:prstGeom prst="rect">
             <a:avLst/>
@@ -5116,7 +5116,7 @@
         <p:spPr>
           <a:xfrm>
             <a:off x="144000" y="72000"/>
-            <a:ext cx="9538560" cy="646560"/>
+            <a:ext cx="9538200" cy="646200"/>
           </a:xfrm>
           <a:prstGeom prst="rect">
             <a:avLst/>
@@ -5162,7 +5162,7 @@
         <p:spPr>
           <a:xfrm>
             <a:off x="504000" y="1283760"/>
-            <a:ext cx="9070200" cy="3286800"/>
+            <a:ext cx="9069840" cy="3286440"/>
           </a:xfrm>
           <a:prstGeom prst="rect">
             <a:avLst/>
@@ -5242,7 +5242,7 @@
         <p:txBody>
           <a:bodyPr/>
           <a:p>
-            <a:fld id="{4F68EA56-170C-4F31-8297-6C546694F62D}" type="slidenum">
+            <a:fld id="{74AD9C0E-EF6B-4FCC-921E-C936A9EE9E43}" type="slidenum">
               <a:t>2</a:t>
             </a:fld>
           </a:p>
@@ -5291,7 +5291,7 @@
         <p:spPr>
           <a:xfrm>
             <a:off x="144000" y="72000"/>
-            <a:ext cx="9538560" cy="646560"/>
+            <a:ext cx="9538200" cy="646200"/>
           </a:xfrm>
           <a:prstGeom prst="rect">
             <a:avLst/>
@@ -5336,8 +5336,8 @@
         </p:nvSpPr>
         <p:spPr>
           <a:xfrm>
-            <a:off x="504000" y="1326600"/>
-            <a:ext cx="9070200" cy="3286800"/>
+            <a:off x="504000" y="1371600"/>
+            <a:ext cx="9069840" cy="3286440"/>
           </a:xfrm>
           <a:prstGeom prst="rect">
             <a:avLst/>
@@ -5366,7 +5366,7 @@
             <a:r>
               <a:rPr b="0" lang="nl" sz="1800" spc="-1" strike="noStrike">
                 <a:solidFill>
-                  <a:srgbClr val="adadad"/>
+                  <a:srgbClr val="ffffff"/>
                 </a:solidFill>
                 <a:latin typeface="Arial"/>
                 <a:ea typeface="Arial"/>
@@ -5374,6 +5374,9 @@
               <a:t>Wat zijn de requirements</a:t>
             </a:r>
             <a:endParaRPr b="0" lang="en-US" sz="1800" spc="-1" strike="noStrike">
+              <a:solidFill>
+                <a:srgbClr val="ffffff"/>
+              </a:solidFill>
               <a:latin typeface="Arial"/>
             </a:endParaRPr>
           </a:p>
@@ -5392,7 +5395,7 @@
             <a:r>
               <a:rPr b="0" lang="nl" sz="1800" spc="-1" strike="noStrike">
                 <a:solidFill>
-                  <a:srgbClr val="adadad"/>
+                  <a:srgbClr val="ffffff"/>
                 </a:solidFill>
                 <a:latin typeface="Arial"/>
                 <a:ea typeface="Arial"/>
@@ -5400,6 +5403,9 @@
               <a:t>Demo</a:t>
             </a:r>
             <a:endParaRPr b="0" lang="en-US" sz="1800" spc="-1" strike="noStrike">
+              <a:solidFill>
+                <a:srgbClr val="ffffff"/>
+              </a:solidFill>
               <a:latin typeface="Arial"/>
             </a:endParaRPr>
           </a:p>
@@ -5418,7 +5424,7 @@
             <a:r>
               <a:rPr b="0" lang="nl" sz="1800" spc="-1" strike="noStrike">
                 <a:solidFill>
-                  <a:srgbClr val="adadad"/>
+                  <a:srgbClr val="ffffff"/>
                 </a:solidFill>
                 <a:latin typeface="Arial"/>
                 <a:ea typeface="Arial"/>
@@ -5426,6 +5432,9 @@
               <a:t>Uitleg project structuur</a:t>
             </a:r>
             <a:endParaRPr b="0" lang="en-US" sz="1800" spc="-1" strike="noStrike">
+              <a:solidFill>
+                <a:srgbClr val="ffffff"/>
+              </a:solidFill>
               <a:latin typeface="Arial"/>
             </a:endParaRPr>
           </a:p>
@@ -5444,7 +5453,7 @@
             <a:r>
               <a:rPr b="0" lang="nl" sz="1800" spc="-1" strike="noStrike">
                 <a:solidFill>
-                  <a:srgbClr val="adadad"/>
+                  <a:srgbClr val="ffffff"/>
                 </a:solidFill>
                 <a:latin typeface="Arial"/>
                 <a:ea typeface="Arial"/>
@@ -5452,6 +5461,9 @@
               <a:t>Vragen en Feedback</a:t>
             </a:r>
             <a:endParaRPr b="0" lang="en-US" sz="1800" spc="-1" strike="noStrike">
+              <a:solidFill>
+                <a:srgbClr val="ffffff"/>
+              </a:solidFill>
               <a:latin typeface="Arial"/>
             </a:endParaRPr>
           </a:p>
@@ -5470,7 +5482,7 @@
             <a:r>
               <a:rPr b="0" lang="nl" sz="1800" spc="-1" strike="noStrike">
                 <a:solidFill>
-                  <a:srgbClr val="adadad"/>
+                  <a:srgbClr val="ffffff"/>
                 </a:solidFill>
                 <a:latin typeface="Arial"/>
                 <a:ea typeface="Arial"/>
@@ -5478,6 +5490,9 @@
               <a:t>Afsluiting</a:t>
             </a:r>
             <a:endParaRPr b="0" lang="en-US" sz="1800" spc="-1" strike="noStrike">
+              <a:solidFill>
+                <a:srgbClr val="ffffff"/>
+              </a:solidFill>
               <a:latin typeface="Arial"/>
             </a:endParaRPr>
           </a:p>
@@ -5497,7 +5512,7 @@
         <p:txBody>
           <a:bodyPr/>
           <a:p>
-            <a:fld id="{A8EFC766-ACED-42CC-A291-C2C9E190D67B}" type="slidenum">
+            <a:fld id="{ED8F02D3-1B9A-4CE7-80D1-CF69BFCBC503}" type="slidenum">
               <a:t>3</a:t>
             </a:fld>
           </a:p>
@@ -5546,7 +5561,7 @@
         <p:spPr>
           <a:xfrm>
             <a:off x="144000" y="72000"/>
-            <a:ext cx="9538560" cy="646560"/>
+            <a:ext cx="9538200" cy="646200"/>
           </a:xfrm>
           <a:prstGeom prst="rect">
             <a:avLst/>
@@ -5592,7 +5607,7 @@
         <p:spPr>
           <a:xfrm>
             <a:off x="457200" y="1284120"/>
-            <a:ext cx="9070200" cy="3286800"/>
+            <a:ext cx="9069840" cy="3286440"/>
           </a:xfrm>
           <a:prstGeom prst="rect">
             <a:avLst/>
@@ -5822,7 +5837,7 @@
         <p:txBody>
           <a:bodyPr/>
           <a:p>
-            <a:fld id="{3FD66E4A-F2DC-4826-8038-B81877E49415}" type="slidenum">
+            <a:fld id="{89BEAFEF-4827-444B-8680-ADA2D3FB7E7A}" type="slidenum">
               <a:t>4</a:t>
             </a:fld>
           </a:p>
@@ -5867,7 +5882,7 @@
         <p:spPr>
           <a:xfrm>
             <a:off x="504000" y="1326960"/>
-            <a:ext cx="9070200" cy="3286800"/>
+            <a:ext cx="9069840" cy="3286440"/>
           </a:xfrm>
           <a:prstGeom prst="rect">
             <a:avLst/>
@@ -5913,9 +5928,6 @@
               <a:t>tabel recepten</a:t>
             </a:r>
             <a:endParaRPr b="0" lang="en-US" sz="3200" spc="-1" strike="noStrike">
-              <a:solidFill>
-                <a:srgbClr val="ffffff"/>
-              </a:solidFill>
               <a:latin typeface="Arial"/>
             </a:endParaRPr>
           </a:p>
@@ -5945,9 +5957,6 @@
               <a:t>tabel ingredienten</a:t>
             </a:r>
             <a:endParaRPr b="0" lang="en-US" sz="3200" spc="-1" strike="noStrike">
-              <a:solidFill>
-                <a:srgbClr val="ffffff"/>
-              </a:solidFill>
               <a:latin typeface="Arial"/>
             </a:endParaRPr>
           </a:p>
@@ -5977,9 +5986,6 @@
               <a:t>tabel om deze 2 te koppelen</a:t>
             </a:r>
             <a:endParaRPr b="0" lang="en-US" sz="3200" spc="-1" strike="noStrike">
-              <a:solidFill>
-                <a:srgbClr val="ffffff"/>
-              </a:solidFill>
               <a:latin typeface="Arial"/>
             </a:endParaRPr>
           </a:p>
@@ -6009,9 +6015,6 @@
               <a:t>een recept heeft een timestamp</a:t>
             </a:r>
             <a:endParaRPr b="0" lang="en-US" sz="3200" spc="-1" strike="noStrike">
-              <a:solidFill>
-                <a:srgbClr val="ffffff"/>
-              </a:solidFill>
               <a:latin typeface="Arial"/>
             </a:endParaRPr>
           </a:p>
@@ -6030,7 +6033,7 @@
         <p:spPr>
           <a:xfrm>
             <a:off x="144000" y="72000"/>
-            <a:ext cx="9538560" cy="646560"/>
+            <a:ext cx="9538200" cy="646200"/>
           </a:xfrm>
           <a:prstGeom prst="rect">
             <a:avLst/>
@@ -6077,7 +6080,7 @@
         <p:txBody>
           <a:bodyPr/>
           <a:p>
-            <a:fld id="{9E7959B2-A465-4A7D-B42A-A07D177D8D5B}" type="slidenum">
+            <a:fld id="{439DB376-5F9B-46E1-8F9D-DC105298ED0A}" type="slidenum">
               <a:t>5</a:t>
             </a:fld>
           </a:p>
@@ -6126,7 +6129,7 @@
         <p:spPr>
           <a:xfrm>
             <a:off x="144000" y="72000"/>
-            <a:ext cx="9538560" cy="646560"/>
+            <a:ext cx="9538200" cy="646200"/>
           </a:xfrm>
           <a:prstGeom prst="rect">
             <a:avLst/>
@@ -6172,7 +6175,7 @@
         <p:spPr>
           <a:xfrm>
             <a:off x="504000" y="1326600"/>
-            <a:ext cx="9070200" cy="3286800"/>
+            <a:ext cx="9069840" cy="3286440"/>
           </a:xfrm>
           <a:prstGeom prst="rect">
             <a:avLst/>
@@ -6232,7 +6235,7 @@
         <p:txBody>
           <a:bodyPr/>
           <a:p>
-            <a:fld id="{2F11C848-DF36-4650-90E0-A5842A83BCF6}" type="slidenum">
+            <a:fld id="{324521FB-EF1D-4771-AD12-3E4FEAC500AC}" type="slidenum">
               <a:t>6</a:t>
             </a:fld>
           </a:p>
@@ -6281,7 +6284,7 @@
         <p:spPr>
           <a:xfrm>
             <a:off x="228600" y="1638000"/>
-            <a:ext cx="9538560" cy="646560"/>
+            <a:ext cx="9538200" cy="646200"/>
           </a:xfrm>
           <a:prstGeom prst="rect">
             <a:avLst/>
@@ -6328,7 +6331,7 @@
         <p:txBody>
           <a:bodyPr/>
           <a:p>
-            <a:fld id="{01D6D555-FCFE-4E5D-9DFD-50E5253E58A0}" type="slidenum">
+            <a:fld id="{3482EB0D-8371-4D19-8A5A-C326FA7D2C1B}" type="slidenum">
               <a:t>7</a:t>
             </a:fld>
           </a:p>
@@ -6377,7 +6380,7 @@
         <p:spPr>
           <a:xfrm>
             <a:off x="228600" y="1600200"/>
-            <a:ext cx="9538560" cy="646560"/>
+            <a:ext cx="9538200" cy="646200"/>
           </a:xfrm>
           <a:prstGeom prst="rect">
             <a:avLst/>
@@ -6424,7 +6427,7 @@
         <p:txBody>
           <a:bodyPr/>
           <a:p>
-            <a:fld id="{9A9E3B49-599E-42CF-A2B2-F1A522EE81EB}" type="slidenum">
+            <a:fld id="{E11BFC45-5771-4C16-B399-2FF32219462D}" type="slidenum">
               <a:t>8</a:t>
             </a:fld>
           </a:p>
@@ -6473,7 +6476,7 @@
         <p:spPr>
           <a:xfrm>
             <a:off x="228600" y="1638000"/>
-            <a:ext cx="9538560" cy="646560"/>
+            <a:ext cx="9538200" cy="646200"/>
           </a:xfrm>
           <a:prstGeom prst="rect">
             <a:avLst/>
@@ -6520,7 +6523,7 @@
         <p:txBody>
           <a:bodyPr/>
           <a:p>
-            <a:fld id="{CFE0F5D9-7180-4A69-93C9-4049B0D22EDA}" type="slidenum">
+            <a:fld id="{A7E5B74B-3720-4D3B-9A49-788A7DC106C0}" type="slidenum">
               <a:t>9</a:t>
             </a:fld>
           </a:p>

</xml_diff>